<commit_message>
Resolved //TODO questions per today's mtg w partner
</commit_message>
<xml_diff>
--- a/docs/deployment_guide/images/keyrus-salesforce-architecture-diagrams.pptx
+++ b/docs/deployment_guide/images/keyrus-salesforce-architecture-diagrams.pptx
@@ -286,7 +286,7 @@
           <a:p>
             <a:fld id="{622C37FE-0381-8947-8A34-F3E5119C461F}" type="datetimeFigureOut">
               <a:rPr lang="en-US" smtClean="0"/>
-              <a:t>9/30/2022</a:t>
+              <a:t>10/14/2022</a:t>
             </a:fld>
             <a:endParaRPr lang="en-US"/>
           </a:p>
@@ -484,7 +484,7 @@
           <a:p>
             <a:fld id="{622C37FE-0381-8947-8A34-F3E5119C461F}" type="datetimeFigureOut">
               <a:rPr lang="en-US" smtClean="0"/>
-              <a:t>9/30/2022</a:t>
+              <a:t>10/14/2022</a:t>
             </a:fld>
             <a:endParaRPr lang="en-US"/>
           </a:p>
@@ -692,7 +692,7 @@
           <a:p>
             <a:fld id="{622C37FE-0381-8947-8A34-F3E5119C461F}" type="datetimeFigureOut">
               <a:rPr lang="en-US" smtClean="0"/>
-              <a:t>9/30/2022</a:t>
+              <a:t>10/14/2022</a:t>
             </a:fld>
             <a:endParaRPr lang="en-US"/>
           </a:p>
@@ -890,7 +890,7 @@
           <a:p>
             <a:fld id="{622C37FE-0381-8947-8A34-F3E5119C461F}" type="datetimeFigureOut">
               <a:rPr lang="en-US" smtClean="0"/>
-              <a:t>9/30/2022</a:t>
+              <a:t>10/14/2022</a:t>
             </a:fld>
             <a:endParaRPr lang="en-US"/>
           </a:p>
@@ -1165,7 +1165,7 @@
           <a:p>
             <a:fld id="{622C37FE-0381-8947-8A34-F3E5119C461F}" type="datetimeFigureOut">
               <a:rPr lang="en-US" smtClean="0"/>
-              <a:t>9/30/2022</a:t>
+              <a:t>10/14/2022</a:t>
             </a:fld>
             <a:endParaRPr lang="en-US"/>
           </a:p>
@@ -1430,7 +1430,7 @@
           <a:p>
             <a:fld id="{622C37FE-0381-8947-8A34-F3E5119C461F}" type="datetimeFigureOut">
               <a:rPr lang="en-US" smtClean="0"/>
-              <a:t>9/30/2022</a:t>
+              <a:t>10/14/2022</a:t>
             </a:fld>
             <a:endParaRPr lang="en-US"/>
           </a:p>
@@ -1842,7 +1842,7 @@
           <a:p>
             <a:fld id="{622C37FE-0381-8947-8A34-F3E5119C461F}" type="datetimeFigureOut">
               <a:rPr lang="en-US" smtClean="0"/>
-              <a:t>9/30/2022</a:t>
+              <a:t>10/14/2022</a:t>
             </a:fld>
             <a:endParaRPr lang="en-US"/>
           </a:p>
@@ -1983,7 +1983,7 @@
           <a:p>
             <a:fld id="{622C37FE-0381-8947-8A34-F3E5119C461F}" type="datetimeFigureOut">
               <a:rPr lang="en-US" smtClean="0"/>
-              <a:t>9/30/2022</a:t>
+              <a:t>10/14/2022</a:t>
             </a:fld>
             <a:endParaRPr lang="en-US"/>
           </a:p>
@@ -2096,7 +2096,7 @@
           <a:p>
             <a:fld id="{622C37FE-0381-8947-8A34-F3E5119C461F}" type="datetimeFigureOut">
               <a:rPr lang="en-US" smtClean="0"/>
-              <a:t>9/30/2022</a:t>
+              <a:t>10/14/2022</a:t>
             </a:fld>
             <a:endParaRPr lang="en-US"/>
           </a:p>
@@ -2407,7 +2407,7 @@
           <a:p>
             <a:fld id="{622C37FE-0381-8947-8A34-F3E5119C461F}" type="datetimeFigureOut">
               <a:rPr lang="en-US" smtClean="0"/>
-              <a:t>9/30/2022</a:t>
+              <a:t>10/14/2022</a:t>
             </a:fld>
             <a:endParaRPr lang="en-US"/>
           </a:p>
@@ -2695,7 +2695,7 @@
           <a:p>
             <a:fld id="{622C37FE-0381-8947-8A34-F3E5119C461F}" type="datetimeFigureOut">
               <a:rPr lang="en-US" smtClean="0"/>
-              <a:t>9/30/2022</a:t>
+              <a:t>10/14/2022</a:t>
             </a:fld>
             <a:endParaRPr lang="en-US"/>
           </a:p>
@@ -2936,7 +2936,7 @@
           <a:p>
             <a:fld id="{622C37FE-0381-8947-8A34-F3E5119C461F}" type="datetimeFigureOut">
               <a:rPr lang="en-US" smtClean="0"/>
-              <a:t>9/30/2022</a:t>
+              <a:t>10/14/2022</a:t>
             </a:fld>
             <a:endParaRPr lang="en-US"/>
           </a:p>
@@ -3367,8 +3367,8 @@
         </p:nvSpPr>
         <p:spPr>
           <a:xfrm>
-            <a:off x="1098957" y="655099"/>
-            <a:ext cx="8875790" cy="5440902"/>
+            <a:off x="1098958" y="655099"/>
+            <a:ext cx="8477636" cy="4844095"/>
           </a:xfrm>
           <a:prstGeom prst="rect">
             <a:avLst/>
@@ -3471,7 +3471,7 @@
         </p:nvSpPr>
         <p:spPr>
           <a:xfrm>
-            <a:off x="1324921" y="1620070"/>
+            <a:off x="1324921" y="1358806"/>
             <a:ext cx="5781273" cy="3814353"/>
           </a:xfrm>
           <a:prstGeom prst="rect">
@@ -3646,7 +3646,7 @@
         </p:blipFill>
         <p:spPr>
           <a:xfrm>
-            <a:off x="1327326" y="1619600"/>
+            <a:off x="1327326" y="1358336"/>
             <a:ext cx="381000" cy="381000"/>
           </a:xfrm>
           <a:prstGeom prst="rect">
@@ -3668,8 +3668,8 @@
         </p:nvSpPr>
         <p:spPr>
           <a:xfrm>
-            <a:off x="5077097" y="1289144"/>
-            <a:ext cx="1846218" cy="4337936"/>
+            <a:off x="5077097" y="1027880"/>
+            <a:ext cx="1846218" cy="4310474"/>
           </a:xfrm>
           <a:prstGeom prst="rect">
             <a:avLst/>
@@ -3738,8 +3738,8 @@
         </p:nvSpPr>
         <p:spPr>
           <a:xfrm>
-            <a:off x="1784982" y="1289143"/>
-            <a:ext cx="1863909" cy="4337937"/>
+            <a:off x="1784982" y="1027879"/>
+            <a:ext cx="1863909" cy="4310475"/>
           </a:xfrm>
           <a:prstGeom prst="rect">
             <a:avLst/>
@@ -3808,7 +3808,7 @@
         </p:nvSpPr>
         <p:spPr>
           <a:xfrm>
-            <a:off x="1934324" y="1943985"/>
+            <a:off x="1934324" y="1682721"/>
             <a:ext cx="1583939" cy="1604205"/>
           </a:xfrm>
           <a:prstGeom prst="rect">
@@ -3894,7 +3894,7 @@
         </p:blipFill>
         <p:spPr>
           <a:xfrm>
-            <a:off x="1934959" y="1945573"/>
+            <a:off x="1934959" y="1684309"/>
             <a:ext cx="381000" cy="381000"/>
           </a:xfrm>
           <a:prstGeom prst="rect">
@@ -3916,7 +3916,7 @@
         </p:nvSpPr>
         <p:spPr>
           <a:xfrm>
-            <a:off x="5211057" y="1943985"/>
+            <a:off x="5211057" y="1682721"/>
             <a:ext cx="1581912" cy="1604205"/>
           </a:xfrm>
           <a:prstGeom prst="rect">
@@ -4002,7 +4002,7 @@
         </p:blipFill>
         <p:spPr>
           <a:xfrm>
-            <a:off x="5211200" y="1943985"/>
+            <a:off x="5211200" y="1682721"/>
             <a:ext cx="381000" cy="381000"/>
           </a:xfrm>
           <a:prstGeom prst="rect">
@@ -4024,7 +4024,7 @@
         </p:nvSpPr>
         <p:spPr>
           <a:xfrm>
-            <a:off x="1934324" y="3691970"/>
+            <a:off x="1934324" y="3430706"/>
             <a:ext cx="1583938" cy="1624456"/>
           </a:xfrm>
           <a:prstGeom prst="rect">
@@ -4201,7 +4201,7 @@
         </p:blipFill>
         <p:spPr>
           <a:xfrm>
-            <a:off x="1934959" y="3686798"/>
+            <a:off x="1934959" y="3425534"/>
             <a:ext cx="381000" cy="381000"/>
           </a:xfrm>
           <a:prstGeom prst="rect">
@@ -4223,7 +4223,7 @@
         </p:nvSpPr>
         <p:spPr>
           <a:xfrm>
-            <a:off x="5211057" y="3691970"/>
+            <a:off x="5211057" y="3430706"/>
             <a:ext cx="1581912" cy="1624456"/>
           </a:xfrm>
           <a:prstGeom prst="rect">
@@ -4400,7 +4400,7 @@
         </p:blipFill>
         <p:spPr>
           <a:xfrm>
-            <a:off x="5211200" y="3688616"/>
+            <a:off x="5211200" y="3427352"/>
             <a:ext cx="381000" cy="381000"/>
           </a:xfrm>
           <a:prstGeom prst="rect">
@@ -4437,7 +4437,7 @@
         </p:blipFill>
         <p:spPr bwMode="auto">
           <a:xfrm>
-            <a:off x="7453104" y="2206901"/>
+            <a:off x="7904771" y="1518878"/>
             <a:ext cx="762000" cy="762000"/>
           </a:xfrm>
           <a:prstGeom prst="rect">
@@ -4484,7 +4484,7 @@
         </p:nvSpPr>
         <p:spPr bwMode="auto">
           <a:xfrm>
-            <a:off x="7115380" y="2981814"/>
+            <a:off x="7567047" y="2289115"/>
             <a:ext cx="1437448" cy="278528"/>
           </a:xfrm>
           <a:prstGeom prst="rect">
@@ -4658,7 +4658,7 @@
         </p:blipFill>
         <p:spPr bwMode="auto">
           <a:xfrm>
-            <a:off x="7453104" y="3506052"/>
+            <a:off x="7325492" y="2798740"/>
             <a:ext cx="762000" cy="762000"/>
           </a:xfrm>
           <a:prstGeom prst="rect">
@@ -4705,7 +4705,7 @@
         </p:nvSpPr>
         <p:spPr bwMode="auto">
           <a:xfrm>
-            <a:off x="7269215" y="4276289"/>
+            <a:off x="7141603" y="3568977"/>
             <a:ext cx="1129778" cy="281491"/>
           </a:xfrm>
           <a:prstGeom prst="rect">
@@ -4866,7 +4866,7 @@
         </p:nvSpPr>
         <p:spPr bwMode="auto">
           <a:xfrm>
-            <a:off x="5384630" y="2940372"/>
+            <a:off x="5384630" y="2679108"/>
             <a:ext cx="1234766" cy="261610"/>
           </a:xfrm>
           <a:prstGeom prst="rect">
@@ -5040,7 +5040,7 @@
         </p:blipFill>
         <p:spPr bwMode="auto">
           <a:xfrm>
-            <a:off x="5773413" y="2481585"/>
+            <a:off x="5773413" y="2220321"/>
             <a:ext cx="457200" cy="457200"/>
           </a:xfrm>
           <a:prstGeom prst="rect">
@@ -5073,10 +5073,10 @@
       </p:pic>
       <p:pic>
         <p:nvPicPr>
-          <p:cNvPr id="26" name="Graphic 23">
-            <a:extLst>
-              <a:ext uri="{FF2B5EF4-FFF2-40B4-BE49-F238E27FC236}">
-                <a16:creationId xmlns:a16="http://schemas.microsoft.com/office/drawing/2014/main" id="{AF6C3AE6-02C2-19AA-8809-CF9FC997F32E}"/>
+          <p:cNvPr id="32" name="Graphic 7">
+            <a:extLst>
+              <a:ext uri="{FF2B5EF4-FFF2-40B4-BE49-F238E27FC236}">
+                <a16:creationId xmlns:a16="http://schemas.microsoft.com/office/drawing/2014/main" id="{2AA99594-FA80-7828-00E2-EAC8CBFC79C0}"/>
               </a:ext>
             </a:extLst>
           </p:cNvPr>
@@ -5100,7 +5100,7 @@
         </p:blipFill>
         <p:spPr bwMode="auto">
           <a:xfrm>
-            <a:off x="7453104" y="879718"/>
+            <a:off x="8608095" y="4125923"/>
             <a:ext cx="762000" cy="762000"/>
           </a:xfrm>
           <a:prstGeom prst="rect">
@@ -5133,10 +5133,10 @@
       </p:pic>
       <p:sp>
         <p:nvSpPr>
-          <p:cNvPr id="28" name="TextBox 15">
-            <a:extLst>
-              <a:ext uri="{FF2B5EF4-FFF2-40B4-BE49-F238E27FC236}">
-                <a16:creationId xmlns:a16="http://schemas.microsoft.com/office/drawing/2014/main" id="{6B62B230-A1C4-8E60-59DA-02F9ACEA165B}"/>
+          <p:cNvPr id="33" name="TextBox 9">
+            <a:extLst>
+              <a:ext uri="{FF2B5EF4-FFF2-40B4-BE49-F238E27FC236}">
+                <a16:creationId xmlns:a16="http://schemas.microsoft.com/office/drawing/2014/main" id="{1F4C0833-2A25-EDF5-E3C6-571DDA0C92A9}"/>
               </a:ext>
             </a:extLst>
           </p:cNvPr>
@@ -5147,449 +5147,7 @@
         </p:nvSpPr>
         <p:spPr bwMode="auto">
           <a:xfrm>
-            <a:off x="7066640" y="1641718"/>
-            <a:ext cx="1534928" cy="276999"/>
-          </a:xfrm>
-          <a:prstGeom prst="rect">
-            <a:avLst/>
-          </a:prstGeom>
-          <a:noFill/>
-          <a:ln>
-            <a:noFill/>
-          </a:ln>
-          <a:extLst>
-            <a:ext uri="{909E8E84-426E-40DD-AFC4-6F175D3DCCD1}">
-              <a14:hiddenFill xmlns:a14="http://schemas.microsoft.com/office/drawing/2010/main">
-                <a:solidFill>
-                  <a:srgbClr val="FFFFFF"/>
-                </a:solidFill>
-              </a14:hiddenFill>
-            </a:ext>
-            <a:ext uri="{91240B29-F687-4F45-9708-019B960494DF}">
-              <a14:hiddenLine xmlns:a14="http://schemas.microsoft.com/office/drawing/2010/main" w="9525">
-                <a:solidFill>
-                  <a:srgbClr val="000000"/>
-                </a:solidFill>
-                <a:miter lim="800000"/>
-                <a:headEnd/>
-                <a:tailEnd/>
-              </a14:hiddenLine>
-            </a:ext>
-          </a:extLst>
-        </p:spPr>
-        <p:txBody>
-          <a:bodyPr wrap="square">
-            <a:spAutoFit/>
-          </a:bodyPr>
-          <a:lstStyle>
-            <a:lvl1pPr>
-              <a:defRPr>
-                <a:solidFill>
-                  <a:schemeClr val="tx1"/>
-                </a:solidFill>
-                <a:latin typeface="Calibri" panose="020F0502020204030204" pitchFamily="34" charset="0"/>
-              </a:defRPr>
-            </a:lvl1pPr>
-            <a:lvl2pPr marL="742950" indent="-285750">
-              <a:defRPr>
-                <a:solidFill>
-                  <a:schemeClr val="tx1"/>
-                </a:solidFill>
-                <a:latin typeface="Calibri" panose="020F0502020204030204" pitchFamily="34" charset="0"/>
-              </a:defRPr>
-            </a:lvl2pPr>
-            <a:lvl3pPr marL="1143000" indent="-228600">
-              <a:defRPr>
-                <a:solidFill>
-                  <a:schemeClr val="tx1"/>
-                </a:solidFill>
-                <a:latin typeface="Calibri" panose="020F0502020204030204" pitchFamily="34" charset="0"/>
-              </a:defRPr>
-            </a:lvl3pPr>
-            <a:lvl4pPr marL="1600200" indent="-228600">
-              <a:defRPr>
-                <a:solidFill>
-                  <a:schemeClr val="tx1"/>
-                </a:solidFill>
-                <a:latin typeface="Calibri" panose="020F0502020204030204" pitchFamily="34" charset="0"/>
-              </a:defRPr>
-            </a:lvl4pPr>
-            <a:lvl5pPr marL="2057400" indent="-228600">
-              <a:defRPr>
-                <a:solidFill>
-                  <a:schemeClr val="tx1"/>
-                </a:solidFill>
-                <a:latin typeface="Calibri" panose="020F0502020204030204" pitchFamily="34" charset="0"/>
-              </a:defRPr>
-            </a:lvl5pPr>
-            <a:lvl6pPr marL="2514600" indent="-228600" eaLnBrk="0" fontAlgn="base" hangingPunct="0">
-              <a:spcBef>
-                <a:spcPct val="0"/>
-              </a:spcBef>
-              <a:spcAft>
-                <a:spcPct val="0"/>
-              </a:spcAft>
-              <a:defRPr>
-                <a:solidFill>
-                  <a:schemeClr val="tx1"/>
-                </a:solidFill>
-                <a:latin typeface="Calibri" panose="020F0502020204030204" pitchFamily="34" charset="0"/>
-              </a:defRPr>
-            </a:lvl6pPr>
-            <a:lvl7pPr marL="2971800" indent="-228600" eaLnBrk="0" fontAlgn="base" hangingPunct="0">
-              <a:spcBef>
-                <a:spcPct val="0"/>
-              </a:spcBef>
-              <a:spcAft>
-                <a:spcPct val="0"/>
-              </a:spcAft>
-              <a:defRPr>
-                <a:solidFill>
-                  <a:schemeClr val="tx1"/>
-                </a:solidFill>
-                <a:latin typeface="Calibri" panose="020F0502020204030204" pitchFamily="34" charset="0"/>
-              </a:defRPr>
-            </a:lvl7pPr>
-            <a:lvl8pPr marL="3429000" indent="-228600" eaLnBrk="0" fontAlgn="base" hangingPunct="0">
-              <a:spcBef>
-                <a:spcPct val="0"/>
-              </a:spcBef>
-              <a:spcAft>
-                <a:spcPct val="0"/>
-              </a:spcAft>
-              <a:defRPr>
-                <a:solidFill>
-                  <a:schemeClr val="tx1"/>
-                </a:solidFill>
-                <a:latin typeface="Calibri" panose="020F0502020204030204" pitchFamily="34" charset="0"/>
-              </a:defRPr>
-            </a:lvl8pPr>
-            <a:lvl9pPr marL="3886200" indent="-228600" eaLnBrk="0" fontAlgn="base" hangingPunct="0">
-              <a:spcBef>
-                <a:spcPct val="0"/>
-              </a:spcBef>
-              <a:spcAft>
-                <a:spcPct val="0"/>
-              </a:spcAft>
-              <a:defRPr>
-                <a:solidFill>
-                  <a:schemeClr val="tx1"/>
-                </a:solidFill>
-                <a:latin typeface="Calibri" panose="020F0502020204030204" pitchFamily="34" charset="0"/>
-              </a:defRPr>
-            </a:lvl9pPr>
-          </a:lstStyle>
-          <a:p>
-            <a:pPr algn="ctr" eaLnBrk="1" hangingPunct="1"/>
-            <a:r>
-              <a:rPr lang="en-US" altLang="en-US" sz="1200" dirty="0">
-                <a:latin typeface="Arial" panose="020B0604020202020204" pitchFamily="34" charset="0"/>
-                <a:ea typeface="Amazon Ember" panose="020B0603020204020204" pitchFamily="34" charset="0"/>
-                <a:cs typeface="Arial" panose="020B0604020202020204" pitchFamily="34" charset="0"/>
-              </a:rPr>
-              <a:t>AWS PrivateLink</a:t>
-            </a:r>
-          </a:p>
-        </p:txBody>
-      </p:sp>
-      <p:pic>
-        <p:nvPicPr>
-          <p:cNvPr id="30" name="Graphic 19">
-            <a:extLst>
-              <a:ext uri="{FF2B5EF4-FFF2-40B4-BE49-F238E27FC236}">
-                <a16:creationId xmlns:a16="http://schemas.microsoft.com/office/drawing/2014/main" id="{D5D6BF0B-933E-7D44-356B-A0A0264D21A1}"/>
-              </a:ext>
-            </a:extLst>
-          </p:cNvPr>
-          <p:cNvPicPr>
-            <a:picLocks noChangeAspect="1" noChangeArrowheads="1"/>
-          </p:cNvPicPr>
-          <p:nvPr/>
-        </p:nvPicPr>
-        <p:blipFill>
-          <a:blip r:embed="rId14">
-            <a:extLst>
-              <a:ext uri="{28A0092B-C50C-407E-A947-70E740481C1C}">
-                <a14:useLocalDpi xmlns:a14="http://schemas.microsoft.com/office/drawing/2010/main" val="0"/>
-              </a:ext>
-            </a:extLst>
-          </a:blip>
-          <a:srcRect/>
-          <a:stretch>
-            <a:fillRect/>
-          </a:stretch>
-        </p:blipFill>
-        <p:spPr bwMode="auto">
-          <a:xfrm>
-            <a:off x="8816507" y="2206901"/>
-            <a:ext cx="762000" cy="762000"/>
-          </a:xfrm>
-          <a:prstGeom prst="rect">
-            <a:avLst/>
-          </a:prstGeom>
-          <a:noFill/>
-          <a:ln>
-            <a:noFill/>
-          </a:ln>
-          <a:extLst>
-            <a:ext uri="{909E8E84-426E-40DD-AFC4-6F175D3DCCD1}">
-              <a14:hiddenFill xmlns:a14="http://schemas.microsoft.com/office/drawing/2010/main">
-                <a:solidFill>
-                  <a:srgbClr val="FFFFFF"/>
-                </a:solidFill>
-              </a14:hiddenFill>
-            </a:ext>
-            <a:ext uri="{91240B29-F687-4F45-9708-019B960494DF}">
-              <a14:hiddenLine xmlns:a14="http://schemas.microsoft.com/office/drawing/2010/main" w="9525">
-                <a:solidFill>
-                  <a:srgbClr val="000000"/>
-                </a:solidFill>
-                <a:miter lim="800000"/>
-                <a:headEnd/>
-                <a:tailEnd/>
-              </a14:hiddenLine>
-            </a:ext>
-          </a:extLst>
-        </p:spPr>
-      </p:pic>
-      <p:sp>
-        <p:nvSpPr>
-          <p:cNvPr id="31" name="TextBox 12">
-            <a:extLst>
-              <a:ext uri="{FF2B5EF4-FFF2-40B4-BE49-F238E27FC236}">
-                <a16:creationId xmlns:a16="http://schemas.microsoft.com/office/drawing/2014/main" id="{CEE6E9F4-DAC4-6E6F-1E0F-6522A233279E}"/>
-              </a:ext>
-            </a:extLst>
-          </p:cNvPr>
-          <p:cNvSpPr txBox="1">
-            <a:spLocks noChangeArrowheads="1"/>
-          </p:cNvSpPr>
-          <p:nvPr/>
-        </p:nvSpPr>
-        <p:spPr bwMode="auto">
-          <a:xfrm>
-            <a:off x="8614883" y="2981814"/>
-            <a:ext cx="1165249" cy="276999"/>
-          </a:xfrm>
-          <a:prstGeom prst="rect">
-            <a:avLst/>
-          </a:prstGeom>
-          <a:noFill/>
-          <a:ln>
-            <a:noFill/>
-          </a:ln>
-          <a:extLst>
-            <a:ext uri="{909E8E84-426E-40DD-AFC4-6F175D3DCCD1}">
-              <a14:hiddenFill xmlns:a14="http://schemas.microsoft.com/office/drawing/2010/main">
-                <a:solidFill>
-                  <a:srgbClr val="FFFFFF"/>
-                </a:solidFill>
-              </a14:hiddenFill>
-            </a:ext>
-            <a:ext uri="{91240B29-F687-4F45-9708-019B960494DF}">
-              <a14:hiddenLine xmlns:a14="http://schemas.microsoft.com/office/drawing/2010/main" w="9525">
-                <a:solidFill>
-                  <a:srgbClr val="000000"/>
-                </a:solidFill>
-                <a:miter lim="800000"/>
-                <a:headEnd/>
-                <a:tailEnd/>
-              </a14:hiddenLine>
-            </a:ext>
-          </a:extLst>
-        </p:spPr>
-        <p:txBody>
-          <a:bodyPr wrap="square">
-            <a:spAutoFit/>
-          </a:bodyPr>
-          <a:lstStyle>
-            <a:lvl1pPr>
-              <a:defRPr>
-                <a:solidFill>
-                  <a:schemeClr val="tx1"/>
-                </a:solidFill>
-                <a:latin typeface="Calibri" panose="020F0502020204030204" pitchFamily="34" charset="0"/>
-              </a:defRPr>
-            </a:lvl1pPr>
-            <a:lvl2pPr marL="742950" indent="-285750">
-              <a:defRPr>
-                <a:solidFill>
-                  <a:schemeClr val="tx1"/>
-                </a:solidFill>
-                <a:latin typeface="Calibri" panose="020F0502020204030204" pitchFamily="34" charset="0"/>
-              </a:defRPr>
-            </a:lvl2pPr>
-            <a:lvl3pPr marL="1143000" indent="-228600">
-              <a:defRPr>
-                <a:solidFill>
-                  <a:schemeClr val="tx1"/>
-                </a:solidFill>
-                <a:latin typeface="Calibri" panose="020F0502020204030204" pitchFamily="34" charset="0"/>
-              </a:defRPr>
-            </a:lvl3pPr>
-            <a:lvl4pPr marL="1600200" indent="-228600">
-              <a:defRPr>
-                <a:solidFill>
-                  <a:schemeClr val="tx1"/>
-                </a:solidFill>
-                <a:latin typeface="Calibri" panose="020F0502020204030204" pitchFamily="34" charset="0"/>
-              </a:defRPr>
-            </a:lvl4pPr>
-            <a:lvl5pPr marL="2057400" indent="-228600">
-              <a:defRPr>
-                <a:solidFill>
-                  <a:schemeClr val="tx1"/>
-                </a:solidFill>
-                <a:latin typeface="Calibri" panose="020F0502020204030204" pitchFamily="34" charset="0"/>
-              </a:defRPr>
-            </a:lvl5pPr>
-            <a:lvl6pPr marL="2514600" indent="-228600" eaLnBrk="0" fontAlgn="base" hangingPunct="0">
-              <a:spcBef>
-                <a:spcPct val="0"/>
-              </a:spcBef>
-              <a:spcAft>
-                <a:spcPct val="0"/>
-              </a:spcAft>
-              <a:defRPr>
-                <a:solidFill>
-                  <a:schemeClr val="tx1"/>
-                </a:solidFill>
-                <a:latin typeface="Calibri" panose="020F0502020204030204" pitchFamily="34" charset="0"/>
-              </a:defRPr>
-            </a:lvl6pPr>
-            <a:lvl7pPr marL="2971800" indent="-228600" eaLnBrk="0" fontAlgn="base" hangingPunct="0">
-              <a:spcBef>
-                <a:spcPct val="0"/>
-              </a:spcBef>
-              <a:spcAft>
-                <a:spcPct val="0"/>
-              </a:spcAft>
-              <a:defRPr>
-                <a:solidFill>
-                  <a:schemeClr val="tx1"/>
-                </a:solidFill>
-                <a:latin typeface="Calibri" panose="020F0502020204030204" pitchFamily="34" charset="0"/>
-              </a:defRPr>
-            </a:lvl7pPr>
-            <a:lvl8pPr marL="3429000" indent="-228600" eaLnBrk="0" fontAlgn="base" hangingPunct="0">
-              <a:spcBef>
-                <a:spcPct val="0"/>
-              </a:spcBef>
-              <a:spcAft>
-                <a:spcPct val="0"/>
-              </a:spcAft>
-              <a:defRPr>
-                <a:solidFill>
-                  <a:schemeClr val="tx1"/>
-                </a:solidFill>
-                <a:latin typeface="Calibri" panose="020F0502020204030204" pitchFamily="34" charset="0"/>
-              </a:defRPr>
-            </a:lvl8pPr>
-            <a:lvl9pPr marL="3886200" indent="-228600" eaLnBrk="0" fontAlgn="base" hangingPunct="0">
-              <a:spcBef>
-                <a:spcPct val="0"/>
-              </a:spcBef>
-              <a:spcAft>
-                <a:spcPct val="0"/>
-              </a:spcAft>
-              <a:defRPr>
-                <a:solidFill>
-                  <a:schemeClr val="tx1"/>
-                </a:solidFill>
-                <a:latin typeface="Calibri" panose="020F0502020204030204" pitchFamily="34" charset="0"/>
-              </a:defRPr>
-            </a:lvl9pPr>
-          </a:lstStyle>
-          <a:p>
-            <a:pPr algn="ctr" eaLnBrk="1" hangingPunct="1"/>
-            <a:r>
-              <a:rPr lang="en-US" altLang="en-US" sz="1200" dirty="0">
-                <a:latin typeface="Arial" panose="020B0604020202020204" pitchFamily="34" charset="0"/>
-                <a:ea typeface="Amazon Ember" panose="020B0603020204020204" pitchFamily="34" charset="0"/>
-                <a:cs typeface="Arial" panose="020B0604020202020204" pitchFamily="34" charset="0"/>
-              </a:rPr>
-              <a:t>IAM</a:t>
-            </a:r>
-          </a:p>
-        </p:txBody>
-      </p:sp>
-      <p:pic>
-        <p:nvPicPr>
-          <p:cNvPr id="32" name="Graphic 7">
-            <a:extLst>
-              <a:ext uri="{FF2B5EF4-FFF2-40B4-BE49-F238E27FC236}">
-                <a16:creationId xmlns:a16="http://schemas.microsoft.com/office/drawing/2014/main" id="{2AA99594-FA80-7828-00E2-EAC8CBFC79C0}"/>
-              </a:ext>
-            </a:extLst>
-          </p:cNvPr>
-          <p:cNvPicPr>
-            <a:picLocks noChangeAspect="1" noChangeArrowheads="1"/>
-          </p:cNvPicPr>
-          <p:nvPr/>
-        </p:nvPicPr>
-        <p:blipFill>
-          <a:blip r:embed="rId15">
-            <a:extLst>
-              <a:ext uri="{28A0092B-C50C-407E-A947-70E740481C1C}">
-                <a14:useLocalDpi xmlns:a14="http://schemas.microsoft.com/office/drawing/2010/main" val="0"/>
-              </a:ext>
-            </a:extLst>
-          </a:blip>
-          <a:srcRect/>
-          <a:stretch>
-            <a:fillRect/>
-          </a:stretch>
-        </p:blipFill>
-        <p:spPr bwMode="auto">
-          <a:xfrm>
-            <a:off x="8816507" y="4953749"/>
-            <a:ext cx="762000" cy="762000"/>
-          </a:xfrm>
-          <a:prstGeom prst="rect">
-            <a:avLst/>
-          </a:prstGeom>
-          <a:noFill/>
-          <a:ln>
-            <a:noFill/>
-          </a:ln>
-          <a:extLst>
-            <a:ext uri="{909E8E84-426E-40DD-AFC4-6F175D3DCCD1}">
-              <a14:hiddenFill xmlns:a14="http://schemas.microsoft.com/office/drawing/2010/main">
-                <a:solidFill>
-                  <a:srgbClr val="FFFFFF"/>
-                </a:solidFill>
-              </a14:hiddenFill>
-            </a:ext>
-            <a:ext uri="{91240B29-F687-4F45-9708-019B960494DF}">
-              <a14:hiddenLine xmlns:a14="http://schemas.microsoft.com/office/drawing/2010/main" w="9525">
-                <a:solidFill>
-                  <a:srgbClr val="000000"/>
-                </a:solidFill>
-                <a:miter lim="800000"/>
-                <a:headEnd/>
-                <a:tailEnd/>
-              </a14:hiddenLine>
-            </a:ext>
-          </a:extLst>
-        </p:spPr>
-      </p:pic>
-      <p:sp>
-        <p:nvSpPr>
-          <p:cNvPr id="33" name="TextBox 9">
-            <a:extLst>
-              <a:ext uri="{FF2B5EF4-FFF2-40B4-BE49-F238E27FC236}">
-                <a16:creationId xmlns:a16="http://schemas.microsoft.com/office/drawing/2014/main" id="{1F4C0833-2A25-EDF5-E3C6-571DDA0C92A9}"/>
-              </a:ext>
-            </a:extLst>
-          </p:cNvPr>
-          <p:cNvSpPr txBox="1">
-            <a:spLocks noChangeArrowheads="1"/>
-          </p:cNvSpPr>
-          <p:nvPr/>
-        </p:nvSpPr>
-        <p:spPr bwMode="auto">
-          <a:xfrm>
-            <a:off x="8623394" y="5716901"/>
+            <a:off x="8414982" y="4896160"/>
             <a:ext cx="1148226" cy="276999"/>
           </a:xfrm>
           <a:prstGeom prst="rect">
@@ -5749,7 +5307,7 @@
           <p:nvPr/>
         </p:nvPicPr>
         <p:blipFill>
-          <a:blip r:embed="rId16">
+          <a:blip r:embed="rId14">
             <a:extLst>
               <a:ext uri="{28A0092B-C50C-407E-A947-70E740481C1C}">
                 <a14:useLocalDpi xmlns:a14="http://schemas.microsoft.com/office/drawing/2010/main" val="0"/>
@@ -5763,7 +5321,7 @@
         </p:blipFill>
         <p:spPr bwMode="auto">
           <a:xfrm>
-            <a:off x="8816507" y="3506052"/>
+            <a:off x="8608095" y="2798740"/>
             <a:ext cx="762000" cy="762000"/>
           </a:xfrm>
           <a:prstGeom prst="rect">
@@ -5810,7 +5368,7 @@
         </p:nvSpPr>
         <p:spPr bwMode="auto">
           <a:xfrm>
-            <a:off x="8575174" y="4276289"/>
+            <a:off x="8366762" y="3568977"/>
             <a:ext cx="1244667" cy="461665"/>
           </a:xfrm>
           <a:prstGeom prst="rect">
@@ -5985,7 +5543,7 @@
           <p:nvPr/>
         </p:nvPicPr>
         <p:blipFill>
-          <a:blip r:embed="rId17">
+          <a:blip r:embed="rId15">
             <a:extLst>
               <a:ext uri="{28A0092B-C50C-407E-A947-70E740481C1C}">
                 <a14:useLocalDpi xmlns:a14="http://schemas.microsoft.com/office/drawing/2010/main" val="0"/>
@@ -5999,7 +5557,7 @@
         </p:blipFill>
         <p:spPr bwMode="auto">
           <a:xfrm>
-            <a:off x="7453104" y="4953749"/>
+            <a:off x="7344631" y="4125923"/>
             <a:ext cx="762000" cy="762000"/>
           </a:xfrm>
           <a:prstGeom prst="rect">
@@ -6046,7 +5604,7 @@
         </p:nvSpPr>
         <p:spPr bwMode="auto">
           <a:xfrm>
-            <a:off x="7221054" y="5716901"/>
+            <a:off x="7112581" y="4889075"/>
             <a:ext cx="1226101" cy="276999"/>
           </a:xfrm>
           <a:prstGeom prst="rect">
@@ -6206,7 +5764,7 @@
           <p:nvPr/>
         </p:nvPicPr>
         <p:blipFill>
-          <a:blip r:embed="rId18">
+          <a:blip r:embed="rId16">
             <a:extLst>
               <a:ext uri="{28A0092B-C50C-407E-A947-70E740481C1C}">
                 <a14:useLocalDpi xmlns:a14="http://schemas.microsoft.com/office/drawing/2010/main" val="0"/>
@@ -6220,7 +5778,7 @@
         </p:blipFill>
         <p:spPr bwMode="auto">
           <a:xfrm>
-            <a:off x="2497693" y="4238398"/>
+            <a:off x="2497693" y="3977134"/>
             <a:ext cx="457200" cy="457200"/>
           </a:xfrm>
           <a:prstGeom prst="rect">
@@ -6267,7 +5825,7 @@
         </p:nvSpPr>
         <p:spPr bwMode="auto">
           <a:xfrm>
-            <a:off x="2103053" y="4686239"/>
+            <a:off x="2103053" y="4424975"/>
             <a:ext cx="1246481" cy="430887"/>
           </a:xfrm>
           <a:prstGeom prst="rect">
@@ -6442,7 +6000,7 @@
           <p:nvPr/>
         </p:nvPicPr>
         <p:blipFill>
-          <a:blip r:embed="rId18">
+          <a:blip r:embed="rId16">
             <a:extLst>
               <a:ext uri="{28A0092B-C50C-407E-A947-70E740481C1C}">
                 <a14:useLocalDpi xmlns:a14="http://schemas.microsoft.com/office/drawing/2010/main" val="0"/>
@@ -6456,7 +6014,7 @@
         </p:blipFill>
         <p:spPr bwMode="auto">
           <a:xfrm>
-            <a:off x="5773413" y="4234081"/>
+            <a:off x="5773413" y="3972817"/>
             <a:ext cx="457200" cy="457200"/>
           </a:xfrm>
           <a:prstGeom prst="rect">
@@ -6503,7 +6061,7 @@
         </p:nvSpPr>
         <p:spPr bwMode="auto">
           <a:xfrm>
-            <a:off x="5362499" y="4654027"/>
+            <a:off x="5362499" y="4392763"/>
             <a:ext cx="1279028" cy="430887"/>
           </a:xfrm>
           <a:prstGeom prst="rect">
@@ -6679,7 +6237,7 @@
         </p:nvSpPr>
         <p:spPr bwMode="auto">
           <a:xfrm>
-            <a:off x="2108910" y="2919013"/>
+            <a:off x="2108910" y="2657749"/>
             <a:ext cx="1234766" cy="261610"/>
           </a:xfrm>
           <a:prstGeom prst="rect">
@@ -6853,7 +6411,7 @@
         </p:blipFill>
         <p:spPr bwMode="auto">
           <a:xfrm>
-            <a:off x="2497693" y="2460226"/>
+            <a:off x="2497693" y="2198962"/>
             <a:ext cx="457200" cy="457200"/>
           </a:xfrm>
           <a:prstGeom prst="rect">
@@ -6898,7 +6456,7 @@
         </p:nvSpPr>
         <p:spPr>
           <a:xfrm>
-            <a:off x="2046515" y="4177010"/>
+            <a:off x="2046515" y="3915746"/>
             <a:ext cx="4659086" cy="957735"/>
           </a:xfrm>
           <a:prstGeom prst="rect">
@@ -6971,227 +6529,6 @@
                 <a:cs typeface="Arial" panose="020B0604020202020204" pitchFamily="34" charset="0"/>
               </a:rPr>
               <a:t>cluster</a:t>
-            </a:r>
-          </a:p>
-        </p:txBody>
-      </p:sp>
-      <p:pic>
-        <p:nvPicPr>
-          <p:cNvPr id="42" name="Graphic 7">
-            <a:extLst>
-              <a:ext uri="{FF2B5EF4-FFF2-40B4-BE49-F238E27FC236}">
-                <a16:creationId xmlns:a16="http://schemas.microsoft.com/office/drawing/2014/main" id="{BD3C4330-C272-46BE-8B44-C99E4505EFEC}"/>
-              </a:ext>
-            </a:extLst>
-          </p:cNvPr>
-          <p:cNvPicPr>
-            <a:picLocks noChangeAspect="1" noChangeArrowheads="1"/>
-          </p:cNvPicPr>
-          <p:nvPr/>
-        </p:nvPicPr>
-        <p:blipFill>
-          <a:blip r:embed="rId19">
-            <a:extLst>
-              <a:ext uri="{28A0092B-C50C-407E-A947-70E740481C1C}">
-                <a14:useLocalDpi xmlns:a14="http://schemas.microsoft.com/office/drawing/2010/main" val="0"/>
-              </a:ext>
-            </a:extLst>
-          </a:blip>
-          <a:srcRect/>
-          <a:stretch>
-            <a:fillRect/>
-          </a:stretch>
-        </p:blipFill>
-        <p:spPr bwMode="auto">
-          <a:xfrm>
-            <a:off x="8816507" y="879718"/>
-            <a:ext cx="762000" cy="762000"/>
-          </a:xfrm>
-          <a:prstGeom prst="rect">
-            <a:avLst/>
-          </a:prstGeom>
-          <a:noFill/>
-          <a:ln>
-            <a:noFill/>
-          </a:ln>
-          <a:extLst>
-            <a:ext uri="{909E8E84-426E-40DD-AFC4-6F175D3DCCD1}">
-              <a14:hiddenFill xmlns:a14="http://schemas.microsoft.com/office/drawing/2010/main">
-                <a:solidFill>
-                  <a:srgbClr val="FFFFFF"/>
-                </a:solidFill>
-              </a14:hiddenFill>
-            </a:ext>
-            <a:ext uri="{91240B29-F687-4F45-9708-019B960494DF}">
-              <a14:hiddenLine xmlns:a14="http://schemas.microsoft.com/office/drawing/2010/main" w="9525">
-                <a:solidFill>
-                  <a:srgbClr val="000000"/>
-                </a:solidFill>
-                <a:miter lim="800000"/>
-                <a:headEnd/>
-                <a:tailEnd/>
-              </a14:hiddenLine>
-            </a:ext>
-          </a:extLst>
-        </p:spPr>
-      </p:pic>
-      <p:sp>
-        <p:nvSpPr>
-          <p:cNvPr id="45" name="TextBox 10">
-            <a:extLst>
-              <a:ext uri="{FF2B5EF4-FFF2-40B4-BE49-F238E27FC236}">
-                <a16:creationId xmlns:a16="http://schemas.microsoft.com/office/drawing/2014/main" id="{C16E20D0-3FCB-43C0-A9BF-E34E17C01916}"/>
-              </a:ext>
-            </a:extLst>
-          </p:cNvPr>
-          <p:cNvSpPr txBox="1">
-            <a:spLocks noChangeArrowheads="1"/>
-          </p:cNvSpPr>
-          <p:nvPr/>
-        </p:nvSpPr>
-        <p:spPr bwMode="auto">
-          <a:xfrm>
-            <a:off x="8420267" y="1646905"/>
-            <a:ext cx="1554480" cy="276999"/>
-          </a:xfrm>
-          <a:prstGeom prst="rect">
-            <a:avLst/>
-          </a:prstGeom>
-          <a:noFill/>
-          <a:ln>
-            <a:noFill/>
-          </a:ln>
-          <a:extLst>
-            <a:ext uri="{909E8E84-426E-40DD-AFC4-6F175D3DCCD1}">
-              <a14:hiddenFill xmlns:a14="http://schemas.microsoft.com/office/drawing/2010/main">
-                <a:solidFill>
-                  <a:srgbClr val="FFFFFF"/>
-                </a:solidFill>
-              </a14:hiddenFill>
-            </a:ext>
-            <a:ext uri="{91240B29-F687-4F45-9708-019B960494DF}">
-              <a14:hiddenLine xmlns:a14="http://schemas.microsoft.com/office/drawing/2010/main" w="9525">
-                <a:solidFill>
-                  <a:srgbClr val="000000"/>
-                </a:solidFill>
-                <a:miter lim="800000"/>
-                <a:headEnd/>
-                <a:tailEnd/>
-              </a14:hiddenLine>
-            </a:ext>
-          </a:extLst>
-        </p:spPr>
-        <p:txBody>
-          <a:bodyPr>
-            <a:spAutoFit/>
-          </a:bodyPr>
-          <a:lstStyle>
-            <a:lvl1pPr>
-              <a:defRPr>
-                <a:solidFill>
-                  <a:schemeClr val="tx1"/>
-                </a:solidFill>
-                <a:latin typeface="Calibri" panose="020F0502020204030204" pitchFamily="34" charset="0"/>
-              </a:defRPr>
-            </a:lvl1pPr>
-            <a:lvl2pPr marL="742950" indent="-285750">
-              <a:defRPr>
-                <a:solidFill>
-                  <a:schemeClr val="tx1"/>
-                </a:solidFill>
-                <a:latin typeface="Calibri" panose="020F0502020204030204" pitchFamily="34" charset="0"/>
-              </a:defRPr>
-            </a:lvl2pPr>
-            <a:lvl3pPr marL="1143000" indent="-228600">
-              <a:defRPr>
-                <a:solidFill>
-                  <a:schemeClr val="tx1"/>
-                </a:solidFill>
-                <a:latin typeface="Calibri" panose="020F0502020204030204" pitchFamily="34" charset="0"/>
-              </a:defRPr>
-            </a:lvl3pPr>
-            <a:lvl4pPr marL="1600200" indent="-228600">
-              <a:defRPr>
-                <a:solidFill>
-                  <a:schemeClr val="tx1"/>
-                </a:solidFill>
-                <a:latin typeface="Calibri" panose="020F0502020204030204" pitchFamily="34" charset="0"/>
-              </a:defRPr>
-            </a:lvl4pPr>
-            <a:lvl5pPr marL="2057400" indent="-228600">
-              <a:defRPr>
-                <a:solidFill>
-                  <a:schemeClr val="tx1"/>
-                </a:solidFill>
-                <a:latin typeface="Calibri" panose="020F0502020204030204" pitchFamily="34" charset="0"/>
-              </a:defRPr>
-            </a:lvl5pPr>
-            <a:lvl6pPr marL="2514600" indent="-228600" eaLnBrk="0" fontAlgn="base" hangingPunct="0">
-              <a:spcBef>
-                <a:spcPct val="0"/>
-              </a:spcBef>
-              <a:spcAft>
-                <a:spcPct val="0"/>
-              </a:spcAft>
-              <a:defRPr>
-                <a:solidFill>
-                  <a:schemeClr val="tx1"/>
-                </a:solidFill>
-                <a:latin typeface="Calibri" panose="020F0502020204030204" pitchFamily="34" charset="0"/>
-              </a:defRPr>
-            </a:lvl6pPr>
-            <a:lvl7pPr marL="2971800" indent="-228600" eaLnBrk="0" fontAlgn="base" hangingPunct="0">
-              <a:spcBef>
-                <a:spcPct val="0"/>
-              </a:spcBef>
-              <a:spcAft>
-                <a:spcPct val="0"/>
-              </a:spcAft>
-              <a:defRPr>
-                <a:solidFill>
-                  <a:schemeClr val="tx1"/>
-                </a:solidFill>
-                <a:latin typeface="Calibri" panose="020F0502020204030204" pitchFamily="34" charset="0"/>
-              </a:defRPr>
-            </a:lvl7pPr>
-            <a:lvl8pPr marL="3429000" indent="-228600" eaLnBrk="0" fontAlgn="base" hangingPunct="0">
-              <a:spcBef>
-                <a:spcPct val="0"/>
-              </a:spcBef>
-              <a:spcAft>
-                <a:spcPct val="0"/>
-              </a:spcAft>
-              <a:defRPr>
-                <a:solidFill>
-                  <a:schemeClr val="tx1"/>
-                </a:solidFill>
-                <a:latin typeface="Calibri" panose="020F0502020204030204" pitchFamily="34" charset="0"/>
-              </a:defRPr>
-            </a:lvl8pPr>
-            <a:lvl9pPr marL="3886200" indent="-228600" eaLnBrk="0" fontAlgn="base" hangingPunct="0">
-              <a:spcBef>
-                <a:spcPct val="0"/>
-              </a:spcBef>
-              <a:spcAft>
-                <a:spcPct val="0"/>
-              </a:spcAft>
-              <a:defRPr>
-                <a:solidFill>
-                  <a:schemeClr val="tx1"/>
-                </a:solidFill>
-                <a:latin typeface="Calibri" panose="020F0502020204030204" pitchFamily="34" charset="0"/>
-              </a:defRPr>
-            </a:lvl9pPr>
-          </a:lstStyle>
-          <a:p>
-            <a:pPr algn="ctr" eaLnBrk="1" hangingPunct="1"/>
-            <a:r>
-              <a:rPr lang="en-US" altLang="en-US" sz="1200" dirty="0">
-                <a:latin typeface="Arial" panose="020B0604020202020204" pitchFamily="34" charset="0"/>
-                <a:ea typeface="Amazon Ember" panose="020B0603020204020204" pitchFamily="34" charset="0"/>
-                <a:cs typeface="Arial" panose="020B0604020202020204" pitchFamily="34" charset="0"/>
-              </a:rPr>
-              <a:t>Amazon QuickSight</a:t>
             </a:r>
           </a:p>
         </p:txBody>

</xml_diff>